<commit_message>
minor reformatting of one slide
</commit_message>
<xml_diff>
--- a/PowerPoints/14 - Arrays.pptx
+++ b/PowerPoints/14 - Arrays.pptx
@@ -4859,7 +4859,7 @@
         </p:nvGrpSpPr>
         <p:grpSpPr>
           <a:xfrm>
-            <a:off x="1524000" y="1962192"/>
+            <a:off x="1524000" y="1905000"/>
             <a:ext cx="5990491" cy="3513182"/>
             <a:chOff x="1459515" y="1962192"/>
             <a:chExt cx="5990491" cy="3513182"/>
@@ -4985,7 +4985,7 @@
             <a:lstStyle/>
             <a:p>
               <a:r>
-                <a:rPr lang="en-US" sz="1800" i="1">
+                <a:rPr lang="en-US" sz="1800" i="1" dirty="0">
                   <a:latin typeface="+mn-lt"/>
                 </a:rPr>
                 <a:t>Expression</a:t>
@@ -7888,7 +7888,7 @@
         </p:nvSpPr>
         <p:spPr>
           <a:xfrm>
-            <a:off x="1690442" y="5200262"/>
+            <a:off x="1621513" y="5200262"/>
             <a:ext cx="5900974" cy="1015663"/>
           </a:xfrm>
           <a:prstGeom prst="rect">
@@ -11956,7 +11956,7 @@
                 <a:latin typeface="Consolas" pitchFamily="49" charset="0"/>
                 <a:cs typeface="Consolas" pitchFamily="49" charset="0"/>
               </a:rPr>
-              <a:t> = "Integer" | "Boolean" | "Char" | </a:t>
+              <a:t>  = "Integer" | "Boolean" | "Char" | </a:t>
             </a:r>
             <a:r>
               <a:rPr lang="en-US" sz="1800" dirty="0" err="1">
@@ -11995,11 +11995,18 @@
               <a:buNone/>
             </a:pPr>
             <a:r>
+              <a:rPr lang="en-US" sz="1800">
+                <a:latin typeface="Consolas" pitchFamily="49" charset="0"/>
+                <a:cs typeface="Consolas" pitchFamily="49" charset="0"/>
+              </a:rPr>
+              <a:t>variable  = </a:t>
+            </a:r>
+            <a:r>
               <a:rPr lang="en-US" sz="1800" dirty="0">
                 <a:latin typeface="Consolas" pitchFamily="49" charset="0"/>
                 <a:cs typeface="Consolas" pitchFamily="49" charset="0"/>
               </a:rPr>
-              <a:t>variable  = ( </a:t>
+              <a:t>( </a:t>
             </a:r>
             <a:r>
               <a:rPr lang="en-US" sz="1800" dirty="0" err="1">

</xml_diff>

<commit_message>
minor update to one slide
</commit_message>
<xml_diff>
--- a/PowerPoints/14 - Arrays.pptx
+++ b/PowerPoints/14 - Arrays.pptx
@@ -4664,30 +4664,9 @@
             </a:r>
           </a:p>
           <a:p>
-            <a:r>
-              <a:rPr lang="fr-FR" sz="2000" dirty="0" err="1">
-                <a:latin typeface="Consolas" panose="020B0609020204030204" pitchFamily="49" charset="0"/>
-              </a:rPr>
-              <a:t>private</a:t>
-            </a:r>
-            <a:r>
-              <a:rPr lang="fr-FR" sz="2000" dirty="0">
-                <a:latin typeface="Consolas" panose="020B0609020204030204" pitchFamily="49" charset="0"/>
-              </a:rPr>
-              <a:t> Expression </a:t>
-            </a:r>
-            <a:r>
-              <a:rPr lang="fr-FR" sz="2000" dirty="0" err="1">
-                <a:latin typeface="Consolas" panose="020B0609020204030204" pitchFamily="49" charset="0"/>
-              </a:rPr>
-              <a:t>parseIndexExpr</a:t>
-            </a:r>
-            <a:r>
-              <a:rPr lang="fr-FR" sz="2000" dirty="0">
-                <a:latin typeface="Consolas" panose="020B0609020204030204" pitchFamily="49" charset="0"/>
-              </a:rPr>
-              <a:t>()</a:t>
-            </a:r>
+            <a:endParaRPr lang="fr-FR" sz="2000" dirty="0">
+              <a:latin typeface="Consolas" panose="020B0609020204030204" pitchFamily="49" charset="0"/>
+            </a:endParaRPr>
           </a:p>
           <a:p>
             <a:endParaRPr lang="en-US" sz="2000" dirty="0">

</xml_diff>

<commit_message>
minor corrections/updates to several slides
</commit_message>
<xml_diff>
--- a/PowerPoints/14 - Arrays.pptx
+++ b/PowerPoints/14 - Arrays.pptx
@@ -4662,8 +4662,6 @@
               </a:rPr>
               <a:t>()</a:t>
             </a:r>
-          </a:p>
-          <a:p>
             <a:endParaRPr lang="fr-FR" sz="2000" dirty="0">
               <a:latin typeface="Consolas" panose="020B0609020204030204" pitchFamily="49" charset="0"/>
             </a:endParaRPr>
@@ -5856,18 +5854,25 @@
               </a:rPr>
               <a:t>size</a:t>
             </a:r>
+          </a:p>
+          <a:p>
+            <a:pPr lvl="2">
+              <a:buFontTx/>
+              <a:buChar char="–"/>
+            </a:pPr>
             <a:r>
               <a:rPr lang="en-US" dirty="0"/>
-              <a:t> – the size (number of bytes) of a variable with this type</a:t>
+              <a:t>the size (number of bytes) of a variable with this type;</a:t>
             </a:r>
           </a:p>
           <a:p>
             <a:pPr lvl="2">
-              <a:buNone/>
+              <a:buFontTx/>
+              <a:buChar char="–"/>
             </a:pPr>
             <a:r>
               <a:rPr lang="en-US" dirty="0"/>
-              <a:t>	        (computed as </a:t>
+              <a:t>computed as </a:t>
             </a:r>
             <a:r>
               <a:rPr lang="en-US" dirty="0" err="1">
@@ -5888,12 +5893,16 @@
                 <a:latin typeface="Consolas" pitchFamily="49" charset="0"/>
                 <a:cs typeface="Consolas" pitchFamily="49" charset="0"/>
               </a:rPr>
-              <a:t>elementType.size</a:t>
-            </a:r>
-            <a:r>
-              <a:rPr lang="en-US" dirty="0"/>
-              <a:t>)</a:t>
-            </a:r>
+              <a:t>elementType.getSize</a:t>
+            </a:r>
+            <a:r>
+              <a:rPr lang="en-US" dirty="0">
+                <a:latin typeface="Consolas" pitchFamily="49" charset="0"/>
+                <a:cs typeface="Consolas" pitchFamily="49" charset="0"/>
+              </a:rPr>
+              <a:t>()</a:t>
+            </a:r>
+            <a:endParaRPr lang="en-US" dirty="0"/>
           </a:p>
           <a:p>
             <a:endParaRPr lang="en-US" dirty="0"/>
@@ -6595,12 +6604,15 @@
                 <a:latin typeface="Consolas" pitchFamily="49" charset="0"/>
                 <a:cs typeface="Consolas" pitchFamily="49" charset="0"/>
               </a:rPr>
-              <a:t>elementType.size</a:t>
-            </a:r>
-            <a:endParaRPr lang="en-US" sz="1800" dirty="0">
-              <a:latin typeface="Consolas" pitchFamily="49" charset="0"/>
-              <a:cs typeface="Consolas" pitchFamily="49" charset="0"/>
-            </a:endParaRPr>
+              <a:t>elementType.getSize</a:t>
+            </a:r>
+            <a:r>
+              <a:rPr lang="en-US" sz="1800" dirty="0">
+                <a:latin typeface="Consolas" pitchFamily="49" charset="0"/>
+                <a:cs typeface="Consolas" pitchFamily="49" charset="0"/>
+              </a:rPr>
+              <a:t>()</a:t>
+            </a:r>
           </a:p>
           <a:p>
             <a:r>
@@ -11855,7 +11867,7 @@
                 <a:latin typeface="Consolas" pitchFamily="49" charset="0"/>
                 <a:cs typeface="Consolas" pitchFamily="49" charset="0"/>
               </a:rPr>
-              <a:t> "=" "array "</a:t>
+              <a:t> "=" "array"</a:t>
             </a:r>
           </a:p>
           <a:p>
@@ -11885,7 +11897,7 @@
                 <a:latin typeface="Consolas" pitchFamily="49" charset="0"/>
                 <a:cs typeface="Consolas" pitchFamily="49" charset="0"/>
               </a:rPr>
-              <a:t> "] " "of" </a:t>
+              <a:t> "]" "of" </a:t>
             </a:r>
             <a:r>
               <a:rPr lang="en-US" sz="1800" dirty="0" err="1">
@@ -12002,18 +12014,11 @@
               <a:t>paramId</a:t>
             </a:r>
             <a:r>
-              <a:rPr lang="en-US" sz="1800">
-                <a:latin typeface="Consolas" pitchFamily="49" charset="0"/>
-                <a:cs typeface="Consolas" pitchFamily="49" charset="0"/>
-              </a:rPr>
-              <a:t> ) </a:t>
-            </a:r>
-            <a:r>
               <a:rPr lang="en-US" sz="1800" dirty="0">
                 <a:latin typeface="Consolas" pitchFamily="49" charset="0"/>
                 <a:cs typeface="Consolas" pitchFamily="49" charset="0"/>
               </a:rPr>
-              <a:t>{ </a:t>
+              <a:t> ) { </a:t>
             </a:r>
             <a:r>
               <a:rPr lang="en-US" sz="1800" dirty="0" err="1">

</xml_diff>